<commit_message>
Default Deny Audit policy bug fix
</commit_message>
<xml_diff>
--- a/Removable Storage Access Control Samples/Demo/Removable Storage Access Control Management Demo.pptx
+++ b/Removable Storage Access Control Samples/Demo/Removable Storage Access Control Management Demo.pptx
@@ -140,7 +140,7 @@
   <pc:docChgLst>
     <pc:chgData name="Tewang Chen (HENRY)" userId="e9721f04-100c-4083-a3db-e5d51ed68867" providerId="ADAL" clId="{FDD3F037-175F-4C8B-9B33-F36A7F0293FD}"/>
     <pc:docChg chg="undo redo custSel addSld delSld modSld">
-      <pc:chgData name="Tewang Chen (HENRY)" userId="e9721f04-100c-4083-a3db-e5d51ed68867" providerId="ADAL" clId="{FDD3F037-175F-4C8B-9B33-F36A7F0293FD}" dt="2022-04-13T15:30:42.432" v="1253"/>
+      <pc:chgData name="Tewang Chen (HENRY)" userId="e9721f04-100c-4083-a3db-e5d51ed68867" providerId="ADAL" clId="{FDD3F037-175F-4C8B-9B33-F36A7F0293FD}" dt="2022-05-12T20:48:36.140" v="1255" actId="20577"/>
       <pc:docMkLst>
         <pc:docMk/>
       </pc:docMkLst>
@@ -372,7 +372,7 @@
         </pc:picChg>
       </pc:sldChg>
       <pc:sldChg chg="addSp delSp modSp add mod">
-        <pc:chgData name="Tewang Chen (HENRY)" userId="e9721f04-100c-4083-a3db-e5d51ed68867" providerId="ADAL" clId="{FDD3F037-175F-4C8B-9B33-F36A7F0293FD}" dt="2022-04-12T05:13:01.464" v="1231"/>
+        <pc:chgData name="Tewang Chen (HENRY)" userId="e9721f04-100c-4083-a3db-e5d51ed68867" providerId="ADAL" clId="{FDD3F037-175F-4C8B-9B33-F36A7F0293FD}" dt="2022-05-12T20:48:36.140" v="1255" actId="20577"/>
         <pc:sldMkLst>
           <pc:docMk/>
           <pc:sldMk cId="1636812089" sldId="2076138585"/>
@@ -402,7 +402,7 @@
           </ac:spMkLst>
         </pc:spChg>
         <pc:spChg chg="mod">
-          <ac:chgData name="Tewang Chen (HENRY)" userId="e9721f04-100c-4083-a3db-e5d51ed68867" providerId="ADAL" clId="{FDD3F037-175F-4C8B-9B33-F36A7F0293FD}" dt="2022-04-12T04:44:51.363" v="950" actId="1076"/>
+          <ac:chgData name="Tewang Chen (HENRY)" userId="e9721f04-100c-4083-a3db-e5d51ed68867" providerId="ADAL" clId="{FDD3F037-175F-4C8B-9B33-F36A7F0293FD}" dt="2022-05-12T20:48:36.140" v="1255" actId="20577"/>
           <ac:spMkLst>
             <pc:docMk/>
             <pc:sldMk cId="1636812089" sldId="2076138585"/>
@@ -795,7 +795,7 @@
           <a:p>
             <a:fld id="{32F2D6AF-A23B-40B7-9E74-BB80C816C37B}" type="datetimeFigureOut">
               <a:rPr lang="en-US" smtClean="0"/>
-              <a:t>4/13/2022</a:t>
+              <a:t>5/12/2022</a:t>
             </a:fld>
             <a:endParaRPr lang="en-US"/>
           </a:p>
@@ -2061,7 +2061,7 @@
           <a:p>
             <a:fld id="{1BD27626-8FF0-4907-AD58-B991DE6781AA}" type="datetimeFigureOut">
               <a:rPr lang="en-US" smtClean="0"/>
-              <a:t>4/13/2022</a:t>
+              <a:t>5/12/2022</a:t>
             </a:fld>
             <a:endParaRPr lang="en-US"/>
           </a:p>
@@ -2259,7 +2259,7 @@
           <a:p>
             <a:fld id="{1BD27626-8FF0-4907-AD58-B991DE6781AA}" type="datetimeFigureOut">
               <a:rPr lang="en-US" smtClean="0"/>
-              <a:t>4/13/2022</a:t>
+              <a:t>5/12/2022</a:t>
             </a:fld>
             <a:endParaRPr lang="en-US"/>
           </a:p>
@@ -2467,7 +2467,7 @@
           <a:p>
             <a:fld id="{1BD27626-8FF0-4907-AD58-B991DE6781AA}" type="datetimeFigureOut">
               <a:rPr lang="en-US" smtClean="0"/>
-              <a:t>4/13/2022</a:t>
+              <a:t>5/12/2022</a:t>
             </a:fld>
             <a:endParaRPr lang="en-US"/>
           </a:p>
@@ -2738,7 +2738,7 @@
           <a:p>
             <a:fld id="{1BD27626-8FF0-4907-AD58-B991DE6781AA}" type="datetimeFigureOut">
               <a:rPr lang="en-US" smtClean="0"/>
-              <a:t>4/13/2022</a:t>
+              <a:t>5/12/2022</a:t>
             </a:fld>
             <a:endParaRPr lang="en-US"/>
           </a:p>
@@ -3013,7 +3013,7 @@
           <a:p>
             <a:fld id="{1BD27626-8FF0-4907-AD58-B991DE6781AA}" type="datetimeFigureOut">
               <a:rPr lang="en-US" smtClean="0"/>
-              <a:t>4/13/2022</a:t>
+              <a:t>5/12/2022</a:t>
             </a:fld>
             <a:endParaRPr lang="en-US"/>
           </a:p>
@@ -3278,7 +3278,7 @@
           <a:p>
             <a:fld id="{1BD27626-8FF0-4907-AD58-B991DE6781AA}" type="datetimeFigureOut">
               <a:rPr lang="en-US" smtClean="0"/>
-              <a:t>4/13/2022</a:t>
+              <a:t>5/12/2022</a:t>
             </a:fld>
             <a:endParaRPr lang="en-US"/>
           </a:p>
@@ -3690,7 +3690,7 @@
           <a:p>
             <a:fld id="{1BD27626-8FF0-4907-AD58-B991DE6781AA}" type="datetimeFigureOut">
               <a:rPr lang="en-US" smtClean="0"/>
-              <a:t>4/13/2022</a:t>
+              <a:t>5/12/2022</a:t>
             </a:fld>
             <a:endParaRPr lang="en-US"/>
           </a:p>
@@ -3831,7 +3831,7 @@
           <a:p>
             <a:fld id="{1BD27626-8FF0-4907-AD58-B991DE6781AA}" type="datetimeFigureOut">
               <a:rPr lang="en-US" smtClean="0"/>
-              <a:t>4/13/2022</a:t>
+              <a:t>5/12/2022</a:t>
             </a:fld>
             <a:endParaRPr lang="en-US"/>
           </a:p>
@@ -3944,7 +3944,7 @@
           <a:p>
             <a:fld id="{1BD27626-8FF0-4907-AD58-B991DE6781AA}" type="datetimeFigureOut">
               <a:rPr lang="en-US" smtClean="0"/>
-              <a:t>4/13/2022</a:t>
+              <a:t>5/12/2022</a:t>
             </a:fld>
             <a:endParaRPr lang="en-US"/>
           </a:p>
@@ -4255,7 +4255,7 @@
           <a:p>
             <a:fld id="{1BD27626-8FF0-4907-AD58-B991DE6781AA}" type="datetimeFigureOut">
               <a:rPr lang="en-US" smtClean="0"/>
-              <a:t>4/13/2022</a:t>
+              <a:t>5/12/2022</a:t>
             </a:fld>
             <a:endParaRPr lang="en-US"/>
           </a:p>
@@ -4543,7 +4543,7 @@
           <a:p>
             <a:fld id="{1BD27626-8FF0-4907-AD58-B991DE6781AA}" type="datetimeFigureOut">
               <a:rPr lang="en-US" smtClean="0"/>
-              <a:t>4/13/2022</a:t>
+              <a:t>5/12/2022</a:t>
             </a:fld>
             <a:endParaRPr lang="en-US"/>
           </a:p>
@@ -4784,7 +4784,7 @@
           <a:p>
             <a:fld id="{1BD27626-8FF0-4907-AD58-B991DE6781AA}" type="datetimeFigureOut">
               <a:rPr lang="en-US" smtClean="0"/>
-              <a:t>4/13/2022</a:t>
+              <a:t>5/12/2022</a:t>
             </a:fld>
             <a:endParaRPr lang="en-US"/>
           </a:p>
@@ -7071,13 +7071,13 @@
               <a:t>AccessMask</a:t>
             </a:r>
             <a:r>
-              <a:rPr lang="en-US" sz="800" dirty="0">
-                <a:solidFill>
-                  <a:srgbClr val="0000FF"/>
-                </a:solidFill>
-                <a:latin typeface="Consolas" panose="020B0609020204030204" pitchFamily="49" charset="0"/>
-              </a:rPr>
-              <a:t>&gt;3&lt;/</a:t>
+              <a:rPr lang="en-US" sz="800">
+                <a:solidFill>
+                  <a:srgbClr val="0000FF"/>
+                </a:solidFill>
+                <a:latin typeface="Consolas" panose="020B0609020204030204" pitchFamily="49" charset="0"/>
+              </a:rPr>
+              <a:t>&gt;7&lt;/</a:t>
             </a:r>
             <a:r>
               <a:rPr lang="en-US" sz="800" dirty="0" err="1">
@@ -11675,6 +11675,15 @@
 </file>
 
 <file path=customXml/item2.xml><?xml version="1.0" encoding="utf-8"?>
+<?mso-contentType ?>
+<FormTemplates xmlns="http://schemas.microsoft.com/sharepoint/v3/contenttype/forms">
+  <Display>DocumentLibraryForm</Display>
+  <Edit>DocumentLibraryForm</Edit>
+  <New>DocumentLibraryForm</New>
+</FormTemplates>
+</file>
+
+<file path=customXml/item3.xml><?xml version="1.0" encoding="utf-8"?>
 <ct:contentTypeSchema xmlns:ct="http://schemas.microsoft.com/office/2006/metadata/contentType" xmlns:ma="http://schemas.microsoft.com/office/2006/metadata/properties/metaAttributes" ct:_="" ma:_="" ma:contentTypeName="Document" ma:contentTypeID="0x010100F2E3C9F8D8836348BE0ED9B20B9E8E4E" ma:contentTypeVersion="17" ma:contentTypeDescription="Create a new document." ma:contentTypeScope="" ma:versionID="98f0f2b92ed15ae503ff0e5fd03c5f2a">
   <xsd:schema xmlns:xsd="http://www.w3.org/2001/XMLSchema" xmlns:xs="http://www.w3.org/2001/XMLSchema" xmlns:p="http://schemas.microsoft.com/office/2006/metadata/properties" xmlns:ns1="http://schemas.microsoft.com/sharepoint/v3" xmlns:ns2="da08d7dc-04c9-4a4a-814a-c32a0938420f" xmlns:ns3="aad11946-4c9c-4040-b563-8e1b612b28b6" targetNamespace="http://schemas.microsoft.com/office/2006/metadata/properties" ma:root="true" ma:fieldsID="8c861534b6e49b57b65abdd52a22307f" ns1:_="" ns2:_="" ns3:_="">
     <xsd:import namespace="http://schemas.microsoft.com/sharepoint/v3"/>
@@ -11928,15 +11937,6 @@
 </ct:contentTypeSchema>
 </file>
 
-<file path=customXml/item3.xml><?xml version="1.0" encoding="utf-8"?>
-<?mso-contentType ?>
-<FormTemplates xmlns="http://schemas.microsoft.com/sharepoint/v3/contenttype/forms">
-  <Display>DocumentLibraryForm</Display>
-  <Edit>DocumentLibraryForm</Edit>
-  <New>DocumentLibraryForm</New>
-</FormTemplates>
-</file>
-
 <file path=customXml/itemProps1.xml><?xml version="1.0" encoding="utf-8"?>
 <ds:datastoreItem xmlns:ds="http://schemas.openxmlformats.org/officeDocument/2006/customXml" ds:itemID="{5E383F2F-6E8E-455F-AF11-48CC09B6058C}">
   <ds:schemaRefs>
@@ -11956,6 +11956,14 @@
 </file>
 
 <file path=customXml/itemProps2.xml><?xml version="1.0" encoding="utf-8"?>
+<ds:datastoreItem xmlns:ds="http://schemas.openxmlformats.org/officeDocument/2006/customXml" ds:itemID="{3229ECDF-A2A2-4ED6-8500-3707E8B96A4A}">
+  <ds:schemaRefs>
+    <ds:schemaRef ds:uri="http://schemas.microsoft.com/sharepoint/v3/contenttype/forms"/>
+  </ds:schemaRefs>
+</ds:datastoreItem>
+</file>
+
+<file path=customXml/itemProps3.xml><?xml version="1.0" encoding="utf-8"?>
 <ds:datastoreItem xmlns:ds="http://schemas.openxmlformats.org/officeDocument/2006/customXml" ds:itemID="{C223B579-8E02-40AF-8FE0-49D0A1B49B79}">
   <ds:schemaRefs>
     <ds:schemaRef ds:uri="aad11946-4c9c-4040-b563-8e1b612b28b6"/>
@@ -11975,14 +11983,6 @@
 </ds:datastoreItem>
 </file>
 
-<file path=customXml/itemProps3.xml><?xml version="1.0" encoding="utf-8"?>
-<ds:datastoreItem xmlns:ds="http://schemas.openxmlformats.org/officeDocument/2006/customXml" ds:itemID="{3229ECDF-A2A2-4ED6-8500-3707E8B96A4A}">
-  <ds:schemaRefs>
-    <ds:schemaRef ds:uri="http://schemas.microsoft.com/sharepoint/v3/contenttype/forms"/>
-  </ds:schemaRefs>
-</ds:datastoreItem>
-</file>
-
 <file path=docMetadata/LabelInfo.xml><?xml version="1.0" encoding="utf-8"?>
 <clbl:labelList xmlns:clbl="http://schemas.microsoft.com/office/2020/mipLabelMetadata">
   <clbl:label id="{f42aa342-8706-4288-bd11-ebb85995028c}" enabled="1" method="Standard" siteId="{72f988bf-86f1-41af-91ab-2d7cd011db47}" removed="0"/>

</xml_diff>

<commit_message>
Update Removable Storage Access Control Management Demo.pptx
</commit_message>
<xml_diff>
--- a/Removable Storage Access Control Samples/Demo/Removable Storage Access Control Management Demo.pptx
+++ b/Removable Storage Access Control Samples/Demo/Removable Storage Access Control Management Demo.pptx
@@ -140,7 +140,7 @@
   <pc:docChgLst>
     <pc:chgData name="Tewang Chen (HENRY)" userId="e9721f04-100c-4083-a3db-e5d51ed68867" providerId="ADAL" clId="{FDD3F037-175F-4C8B-9B33-F36A7F0293FD}"/>
     <pc:docChg chg="undo redo custSel addSld delSld modSld">
-      <pc:chgData name="Tewang Chen (HENRY)" userId="e9721f04-100c-4083-a3db-e5d51ed68867" providerId="ADAL" clId="{FDD3F037-175F-4C8B-9B33-F36A7F0293FD}" dt="2022-05-16T22:29:17.051" v="1261" actId="20577"/>
+      <pc:chgData name="Tewang Chen (HENRY)" userId="e9721f04-100c-4083-a3db-e5d51ed68867" providerId="ADAL" clId="{FDD3F037-175F-4C8B-9B33-F36A7F0293FD}" dt="2022-05-16T22:34:34.549" v="1263" actId="20577"/>
       <pc:docMkLst>
         <pc:docMk/>
       </pc:docMkLst>
@@ -498,7 +498,7 @@
         </pc:picChg>
       </pc:sldChg>
       <pc:sldChg chg="addSp delSp modSp add mod">
-        <pc:chgData name="Tewang Chen (HENRY)" userId="e9721f04-100c-4083-a3db-e5d51ed68867" providerId="ADAL" clId="{FDD3F037-175F-4C8B-9B33-F36A7F0293FD}" dt="2022-05-16T22:29:17.051" v="1261" actId="20577"/>
+        <pc:chgData name="Tewang Chen (HENRY)" userId="e9721f04-100c-4083-a3db-e5d51ed68867" providerId="ADAL" clId="{FDD3F037-175F-4C8B-9B33-F36A7F0293FD}" dt="2022-05-16T22:34:34.549" v="1263" actId="20577"/>
         <pc:sldMkLst>
           <pc:docMk/>
           <pc:sldMk cId="2329383035" sldId="2076138587"/>
@@ -528,7 +528,7 @@
           </ac:spMkLst>
         </pc:spChg>
         <pc:spChg chg="add mod">
-          <ac:chgData name="Tewang Chen (HENRY)" userId="e9721f04-100c-4083-a3db-e5d51ed68867" providerId="ADAL" clId="{FDD3F037-175F-4C8B-9B33-F36A7F0293FD}" dt="2022-04-12T05:14:01.930" v="1238" actId="14100"/>
+          <ac:chgData name="Tewang Chen (HENRY)" userId="e9721f04-100c-4083-a3db-e5d51ed68867" providerId="ADAL" clId="{FDD3F037-175F-4C8B-9B33-F36A7F0293FD}" dt="2022-05-16T22:34:34.549" v="1263" actId="20577"/>
           <ac:spMkLst>
             <pc:docMk/>
             <pc:sldMk cId="2329383035" sldId="2076138587"/>
@@ -10928,7 +10928,21 @@
                 <a:latin typeface="Segoe UI" panose="020B0502040204020203" pitchFamily="34" charset="0"/>
                 <a:cs typeface="Segoe UI" panose="020B0502040204020203" pitchFamily="34" charset="0"/>
               </a:rPr>
-              <a:t>What is ‘37’ means in the policy? It is 9 + 2+ 36 = 47:</a:t>
+              <a:t>What </a:t>
+            </a:r>
+            <a:r>
+              <a:rPr lang="en-US">
+                <a:latin typeface="Segoe UI" panose="020B0502040204020203" pitchFamily="34" charset="0"/>
+                <a:cs typeface="Segoe UI" panose="020B0502040204020203" pitchFamily="34" charset="0"/>
+              </a:rPr>
+              <a:t>is ‘47</a:t>
+            </a:r>
+            <a:r>
+              <a:rPr lang="en-US" dirty="0">
+                <a:latin typeface="Segoe UI" panose="020B0502040204020203" pitchFamily="34" charset="0"/>
+                <a:cs typeface="Segoe UI" panose="020B0502040204020203" pitchFamily="34" charset="0"/>
+              </a:rPr>
+              <a:t>’ means in the policy? It is 9 + 2+ 36 = 47:</a:t>
             </a:r>
           </a:p>
           <a:p>
@@ -11684,6 +11698,25 @@
 </file>
 
 <file path=customXml/item1.xml><?xml version="1.0" encoding="utf-8"?>
+<p:properties xmlns:p="http://schemas.microsoft.com/office/2006/metadata/properties" xmlns:xsi="http://www.w3.org/2001/XMLSchema-instance" xmlns:pc="http://schemas.microsoft.com/office/infopath/2007/PartnerControls">
+  <documentManagement>
+    <MediaServiceKeyPoints xmlns="aad11946-4c9c-4040-b563-8e1b612b28b6" xsi:nil="true"/>
+    <_ip_UnifiedCompliancePolicyUIAction xmlns="http://schemas.microsoft.com/sharepoint/v3" xsi:nil="true"/>
+    <_ip_UnifiedCompliancePolicyProperties xmlns="http://schemas.microsoft.com/sharepoint/v3" xsi:nil="true"/>
+  </documentManagement>
+</p:properties>
+</file>
+
+<file path=customXml/item2.xml><?xml version="1.0" encoding="utf-8"?>
+<?mso-contentType ?>
+<FormTemplates xmlns="http://schemas.microsoft.com/sharepoint/v3/contenttype/forms">
+  <Display>DocumentLibraryForm</Display>
+  <Edit>DocumentLibraryForm</Edit>
+  <New>DocumentLibraryForm</New>
+</FormTemplates>
+</file>
+
+<file path=customXml/item3.xml><?xml version="1.0" encoding="utf-8"?>
 <ct:contentTypeSchema xmlns:ct="http://schemas.microsoft.com/office/2006/metadata/contentType" xmlns:ma="http://schemas.microsoft.com/office/2006/metadata/properties/metaAttributes" ct:_="" ma:_="" ma:contentTypeName="Document" ma:contentTypeID="0x010100F2E3C9F8D8836348BE0ED9B20B9E8E4E" ma:contentTypeVersion="17" ma:contentTypeDescription="Create a new document." ma:contentTypeScope="" ma:versionID="98f0f2b92ed15ae503ff0e5fd03c5f2a">
   <xsd:schema xmlns:xsd="http://www.w3.org/2001/XMLSchema" xmlns:xs="http://www.w3.org/2001/XMLSchema" xmlns:p="http://schemas.microsoft.com/office/2006/metadata/properties" xmlns:ns1="http://schemas.microsoft.com/sharepoint/v3" xmlns:ns2="da08d7dc-04c9-4a4a-814a-c32a0938420f" xmlns:ns3="aad11946-4c9c-4040-b563-8e1b612b28b6" targetNamespace="http://schemas.microsoft.com/office/2006/metadata/properties" ma:root="true" ma:fieldsID="8c861534b6e49b57b65abdd52a22307f" ns1:_="" ns2:_="" ns3:_="">
     <xsd:import namespace="http://schemas.microsoft.com/sharepoint/v3"/>
@@ -11937,26 +11970,33 @@
 </ct:contentTypeSchema>
 </file>
 
-<file path=customXml/item2.xml><?xml version="1.0" encoding="utf-8"?>
-<?mso-contentType ?>
-<FormTemplates xmlns="http://schemas.microsoft.com/sharepoint/v3/contenttype/forms">
-  <Display>DocumentLibraryForm</Display>
-  <Edit>DocumentLibraryForm</Edit>
-  <New>DocumentLibraryForm</New>
-</FormTemplates>
+<file path=customXml/itemProps1.xml><?xml version="1.0" encoding="utf-8"?>
+<ds:datastoreItem xmlns:ds="http://schemas.openxmlformats.org/officeDocument/2006/customXml" ds:itemID="{5E383F2F-6E8E-455F-AF11-48CC09B6058C}">
+  <ds:schemaRefs>
+    <ds:schemaRef ds:uri="http://purl.org/dc/terms/"/>
+    <ds:schemaRef ds:uri="http://purl.org/dc/elements/1.1/"/>
+    <ds:schemaRef ds:uri="da08d7dc-04c9-4a4a-814a-c32a0938420f"/>
+    <ds:schemaRef ds:uri="http://schemas.openxmlformats.org/package/2006/metadata/core-properties"/>
+    <ds:schemaRef ds:uri="http://purl.org/dc/dcmitype/"/>
+    <ds:schemaRef ds:uri="http://schemas.microsoft.com/sharepoint/v3"/>
+    <ds:schemaRef ds:uri="http://schemas.microsoft.com/office/2006/documentManagement/types"/>
+    <ds:schemaRef ds:uri="http://schemas.microsoft.com/office/infopath/2007/PartnerControls"/>
+    <ds:schemaRef ds:uri="aad11946-4c9c-4040-b563-8e1b612b28b6"/>
+    <ds:schemaRef ds:uri="http://schemas.microsoft.com/office/2006/metadata/properties"/>
+    <ds:schemaRef ds:uri="http://www.w3.org/XML/1998/namespace"/>
+  </ds:schemaRefs>
+</ds:datastoreItem>
 </file>
 
-<file path=customXml/item3.xml><?xml version="1.0" encoding="utf-8"?>
-<p:properties xmlns:p="http://schemas.microsoft.com/office/2006/metadata/properties" xmlns:xsi="http://www.w3.org/2001/XMLSchema-instance" xmlns:pc="http://schemas.microsoft.com/office/infopath/2007/PartnerControls">
-  <documentManagement>
-    <MediaServiceKeyPoints xmlns="aad11946-4c9c-4040-b563-8e1b612b28b6" xsi:nil="true"/>
-    <_ip_UnifiedCompliancePolicyUIAction xmlns="http://schemas.microsoft.com/sharepoint/v3" xsi:nil="true"/>
-    <_ip_UnifiedCompliancePolicyProperties xmlns="http://schemas.microsoft.com/sharepoint/v3" xsi:nil="true"/>
-  </documentManagement>
-</p:properties>
+<file path=customXml/itemProps2.xml><?xml version="1.0" encoding="utf-8"?>
+<ds:datastoreItem xmlns:ds="http://schemas.openxmlformats.org/officeDocument/2006/customXml" ds:itemID="{3229ECDF-A2A2-4ED6-8500-3707E8B96A4A}">
+  <ds:schemaRefs>
+    <ds:schemaRef ds:uri="http://schemas.microsoft.com/sharepoint/v3/contenttype/forms"/>
+  </ds:schemaRefs>
+</ds:datastoreItem>
 </file>
 
-<file path=customXml/itemProps1.xml><?xml version="1.0" encoding="utf-8"?>
+<file path=customXml/itemProps3.xml><?xml version="1.0" encoding="utf-8"?>
 <ds:datastoreItem xmlns:ds="http://schemas.openxmlformats.org/officeDocument/2006/customXml" ds:itemID="{C223B579-8E02-40AF-8FE0-49D0A1B49B79}">
   <ds:schemaRefs>
     <ds:schemaRef ds:uri="aad11946-4c9c-4040-b563-8e1b612b28b6"/>
@@ -11976,32 +12016,6 @@
 </ds:datastoreItem>
 </file>
 
-<file path=customXml/itemProps2.xml><?xml version="1.0" encoding="utf-8"?>
-<ds:datastoreItem xmlns:ds="http://schemas.openxmlformats.org/officeDocument/2006/customXml" ds:itemID="{3229ECDF-A2A2-4ED6-8500-3707E8B96A4A}">
-  <ds:schemaRefs>
-    <ds:schemaRef ds:uri="http://schemas.microsoft.com/sharepoint/v3/contenttype/forms"/>
-  </ds:schemaRefs>
-</ds:datastoreItem>
-</file>
-
-<file path=customXml/itemProps3.xml><?xml version="1.0" encoding="utf-8"?>
-<ds:datastoreItem xmlns:ds="http://schemas.openxmlformats.org/officeDocument/2006/customXml" ds:itemID="{5E383F2F-6E8E-455F-AF11-48CC09B6058C}">
-  <ds:schemaRefs>
-    <ds:schemaRef ds:uri="http://purl.org/dc/terms/"/>
-    <ds:schemaRef ds:uri="http://purl.org/dc/elements/1.1/"/>
-    <ds:schemaRef ds:uri="da08d7dc-04c9-4a4a-814a-c32a0938420f"/>
-    <ds:schemaRef ds:uri="http://schemas.openxmlformats.org/package/2006/metadata/core-properties"/>
-    <ds:schemaRef ds:uri="http://purl.org/dc/dcmitype/"/>
-    <ds:schemaRef ds:uri="http://schemas.microsoft.com/sharepoint/v3"/>
-    <ds:schemaRef ds:uri="http://schemas.microsoft.com/office/2006/documentManagement/types"/>
-    <ds:schemaRef ds:uri="http://schemas.microsoft.com/office/infopath/2007/PartnerControls"/>
-    <ds:schemaRef ds:uri="aad11946-4c9c-4040-b563-8e1b612b28b6"/>
-    <ds:schemaRef ds:uri="http://schemas.microsoft.com/office/2006/metadata/properties"/>
-    <ds:schemaRef ds:uri="http://www.w3.org/XML/1998/namespace"/>
-  </ds:schemaRefs>
-</ds:datastoreItem>
-</file>
-
 <file path=docMetadata/LabelInfo.xml><?xml version="1.0" encoding="utf-8"?>
 <clbl:labelList xmlns:clbl="http://schemas.microsoft.com/office/2020/mipLabelMetadata">
   <clbl:label id="{f42aa342-8706-4288-bd11-ebb85995028c}" enabled="1" method="Standard" siteId="{72f988bf-86f1-41af-91ab-2d7cd011db47}" removed="0"/>

</xml_diff>